<commit_message>
added maxiteration control to calallignment and added calallignment2 for closeup image
</commit_message>
<xml_diff>
--- a/MicasenseMX30API.pptx
+++ b/MicasenseMX30API.pptx
@@ -7,10 +7,11 @@
   <p:sldIdLst>
     <p:sldId id="256" r:id="rId2"/>
     <p:sldId id="257" r:id="rId3"/>
-    <p:sldId id="258" r:id="rId4"/>
-    <p:sldId id="259" r:id="rId5"/>
-    <p:sldId id="260" r:id="rId6"/>
-    <p:sldId id="261" r:id="rId7"/>
+    <p:sldId id="262" r:id="rId4"/>
+    <p:sldId id="258" r:id="rId5"/>
+    <p:sldId id="259" r:id="rId6"/>
+    <p:sldId id="260" r:id="rId7"/>
+    <p:sldId id="261" r:id="rId8"/>
   </p:sldIdLst>
   <p:sldSz cx="12192000" cy="6858000"/>
   <p:notesSz cx="6858000" cy="9144000"/>
@@ -109,6 +110,11 @@
       </a:defRPr>
     </a:lvl9pPr>
   </p:defaultTextStyle>
+  <p:extLst>
+    <p:ext uri="{EFAFB233-063F-42B5-8137-9DF3F51BA10A}">
+      <p15:sldGuideLst xmlns:p15="http://schemas.microsoft.com/office/powerpoint/2012/main"/>
+    </p:ext>
+  </p:extLst>
 </p:presentation>
 </file>
 
@@ -154,10 +160,9 @@
           </a:lstStyle>
           <a:p>
             <a:r>
-              <a:rPr lang="zh-TW" altLang="en-US" smtClean="0"/>
+              <a:rPr lang="zh-TW" altLang="en-US"/>
               <a:t>按一下以編輯母片標題樣式</a:t>
             </a:r>
-            <a:endParaRPr lang="zh-TW" altLang="en-US"/>
           </a:p>
         </p:txBody>
       </p:sp>
@@ -219,10 +224,9 @@
           </a:lstStyle>
           <a:p>
             <a:r>
-              <a:rPr lang="zh-TW" altLang="en-US" smtClean="0"/>
+              <a:rPr lang="zh-TW" altLang="en-US"/>
               <a:t>按一下以編輯母片副標題樣式</a:t>
             </a:r>
-            <a:endParaRPr lang="zh-TW" altLang="en-US"/>
           </a:p>
         </p:txBody>
       </p:sp>
@@ -243,7 +247,7 @@
           <a:p>
             <a:fld id="{EBD1E9CA-27D0-485D-BB40-6DD66428CCC0}" type="datetimeFigureOut">
               <a:rPr lang="zh-TW" altLang="en-US" smtClean="0"/>
-              <a:t>2021/2/15</a:t>
+              <a:t>2021/3/5</a:t>
             </a:fld>
             <a:endParaRPr lang="zh-TW" altLang="en-US"/>
           </a:p>
@@ -337,10 +341,9 @@
           <a:lstStyle/>
           <a:p>
             <a:r>
-              <a:rPr lang="zh-TW" altLang="en-US" smtClean="0"/>
+              <a:rPr lang="zh-TW" altLang="en-US"/>
               <a:t>按一下以編輯母片標題樣式</a:t>
             </a:r>
-            <a:endParaRPr lang="zh-TW" altLang="en-US"/>
           </a:p>
         </p:txBody>
       </p:sp>
@@ -361,38 +364,37 @@
           <a:p>
             <a:pPr lvl="0"/>
             <a:r>
-              <a:rPr lang="zh-TW" altLang="en-US" smtClean="0"/>
+              <a:rPr lang="zh-TW" altLang="en-US"/>
               <a:t>編輯母片文字樣式</a:t>
             </a:r>
           </a:p>
           <a:p>
             <a:pPr lvl="1"/>
             <a:r>
-              <a:rPr lang="zh-TW" altLang="en-US" smtClean="0"/>
+              <a:rPr lang="zh-TW" altLang="en-US"/>
               <a:t>第二層</a:t>
             </a:r>
           </a:p>
           <a:p>
             <a:pPr lvl="2"/>
             <a:r>
-              <a:rPr lang="zh-TW" altLang="en-US" smtClean="0"/>
+              <a:rPr lang="zh-TW" altLang="en-US"/>
               <a:t>第三層</a:t>
             </a:r>
           </a:p>
           <a:p>
             <a:pPr lvl="3"/>
             <a:r>
-              <a:rPr lang="zh-TW" altLang="en-US" smtClean="0"/>
+              <a:rPr lang="zh-TW" altLang="en-US"/>
               <a:t>第四層</a:t>
             </a:r>
           </a:p>
           <a:p>
             <a:pPr lvl="4"/>
             <a:r>
-              <a:rPr lang="zh-TW" altLang="en-US" smtClean="0"/>
+              <a:rPr lang="zh-TW" altLang="en-US"/>
               <a:t>第五層</a:t>
             </a:r>
-            <a:endParaRPr lang="zh-TW" altLang="en-US"/>
           </a:p>
         </p:txBody>
       </p:sp>
@@ -413,7 +415,7 @@
           <a:p>
             <a:fld id="{EBD1E9CA-27D0-485D-BB40-6DD66428CCC0}" type="datetimeFigureOut">
               <a:rPr lang="zh-TW" altLang="en-US" smtClean="0"/>
-              <a:t>2021/2/15</a:t>
+              <a:t>2021/3/5</a:t>
             </a:fld>
             <a:endParaRPr lang="zh-TW" altLang="en-US"/>
           </a:p>
@@ -512,10 +514,9 @@
           <a:lstStyle/>
           <a:p>
             <a:r>
-              <a:rPr lang="zh-TW" altLang="en-US" smtClean="0"/>
+              <a:rPr lang="zh-TW" altLang="en-US"/>
               <a:t>按一下以編輯母片標題樣式</a:t>
             </a:r>
-            <a:endParaRPr lang="zh-TW" altLang="en-US"/>
           </a:p>
         </p:txBody>
       </p:sp>
@@ -541,38 +542,37 @@
           <a:p>
             <a:pPr lvl="0"/>
             <a:r>
-              <a:rPr lang="zh-TW" altLang="en-US" smtClean="0"/>
+              <a:rPr lang="zh-TW" altLang="en-US"/>
               <a:t>編輯母片文字樣式</a:t>
             </a:r>
           </a:p>
           <a:p>
             <a:pPr lvl="1"/>
             <a:r>
-              <a:rPr lang="zh-TW" altLang="en-US" smtClean="0"/>
+              <a:rPr lang="zh-TW" altLang="en-US"/>
               <a:t>第二層</a:t>
             </a:r>
           </a:p>
           <a:p>
             <a:pPr lvl="2"/>
             <a:r>
-              <a:rPr lang="zh-TW" altLang="en-US" smtClean="0"/>
+              <a:rPr lang="zh-TW" altLang="en-US"/>
               <a:t>第三層</a:t>
             </a:r>
           </a:p>
           <a:p>
             <a:pPr lvl="3"/>
             <a:r>
-              <a:rPr lang="zh-TW" altLang="en-US" smtClean="0"/>
+              <a:rPr lang="zh-TW" altLang="en-US"/>
               <a:t>第四層</a:t>
             </a:r>
           </a:p>
           <a:p>
             <a:pPr lvl="4"/>
             <a:r>
-              <a:rPr lang="zh-TW" altLang="en-US" smtClean="0"/>
+              <a:rPr lang="zh-TW" altLang="en-US"/>
               <a:t>第五層</a:t>
             </a:r>
-            <a:endParaRPr lang="zh-TW" altLang="en-US"/>
           </a:p>
         </p:txBody>
       </p:sp>
@@ -593,7 +593,7 @@
           <a:p>
             <a:fld id="{EBD1E9CA-27D0-485D-BB40-6DD66428CCC0}" type="datetimeFigureOut">
               <a:rPr lang="zh-TW" altLang="en-US" smtClean="0"/>
-              <a:t>2021/2/15</a:t>
+              <a:t>2021/3/5</a:t>
             </a:fld>
             <a:endParaRPr lang="zh-TW" altLang="en-US"/>
           </a:p>
@@ -687,10 +687,9 @@
           <a:lstStyle/>
           <a:p>
             <a:r>
-              <a:rPr lang="zh-TW" altLang="en-US" smtClean="0"/>
+              <a:rPr lang="zh-TW" altLang="en-US"/>
               <a:t>按一下以編輯母片標題樣式</a:t>
             </a:r>
-            <a:endParaRPr lang="zh-TW" altLang="en-US"/>
           </a:p>
         </p:txBody>
       </p:sp>
@@ -711,38 +710,37 @@
           <a:p>
             <a:pPr lvl="0"/>
             <a:r>
-              <a:rPr lang="zh-TW" altLang="en-US" smtClean="0"/>
+              <a:rPr lang="zh-TW" altLang="en-US"/>
               <a:t>編輯母片文字樣式</a:t>
             </a:r>
           </a:p>
           <a:p>
             <a:pPr lvl="1"/>
             <a:r>
-              <a:rPr lang="zh-TW" altLang="en-US" smtClean="0"/>
+              <a:rPr lang="zh-TW" altLang="en-US"/>
               <a:t>第二層</a:t>
             </a:r>
           </a:p>
           <a:p>
             <a:pPr lvl="2"/>
             <a:r>
-              <a:rPr lang="zh-TW" altLang="en-US" smtClean="0"/>
+              <a:rPr lang="zh-TW" altLang="en-US"/>
               <a:t>第三層</a:t>
             </a:r>
           </a:p>
           <a:p>
             <a:pPr lvl="3"/>
             <a:r>
-              <a:rPr lang="zh-TW" altLang="en-US" smtClean="0"/>
+              <a:rPr lang="zh-TW" altLang="en-US"/>
               <a:t>第四層</a:t>
             </a:r>
           </a:p>
           <a:p>
             <a:pPr lvl="4"/>
             <a:r>
-              <a:rPr lang="zh-TW" altLang="en-US" smtClean="0"/>
+              <a:rPr lang="zh-TW" altLang="en-US"/>
               <a:t>第五層</a:t>
             </a:r>
-            <a:endParaRPr lang="zh-TW" altLang="en-US"/>
           </a:p>
         </p:txBody>
       </p:sp>
@@ -763,7 +761,7 @@
           <a:p>
             <a:fld id="{EBD1E9CA-27D0-485D-BB40-6DD66428CCC0}" type="datetimeFigureOut">
               <a:rPr lang="zh-TW" altLang="en-US" smtClean="0"/>
-              <a:t>2021/2/15</a:t>
+              <a:t>2021/3/5</a:t>
             </a:fld>
             <a:endParaRPr lang="zh-TW" altLang="en-US"/>
           </a:p>
@@ -866,10 +864,9 @@
           </a:lstStyle>
           <a:p>
             <a:r>
-              <a:rPr lang="zh-TW" altLang="en-US" smtClean="0"/>
+              <a:rPr lang="zh-TW" altLang="en-US"/>
               <a:t>按一下以編輯母片標題樣式</a:t>
             </a:r>
-            <a:endParaRPr lang="zh-TW" altLang="en-US"/>
           </a:p>
         </p:txBody>
       </p:sp>
@@ -986,7 +983,7 @@
           <a:p>
             <a:pPr lvl="0"/>
             <a:r>
-              <a:rPr lang="zh-TW" altLang="en-US" smtClean="0"/>
+              <a:rPr lang="zh-TW" altLang="en-US"/>
               <a:t>編輯母片文字樣式</a:t>
             </a:r>
           </a:p>
@@ -1009,7 +1006,7 @@
           <a:p>
             <a:fld id="{EBD1E9CA-27D0-485D-BB40-6DD66428CCC0}" type="datetimeFigureOut">
               <a:rPr lang="zh-TW" altLang="en-US" smtClean="0"/>
-              <a:t>2021/2/15</a:t>
+              <a:t>2021/3/5</a:t>
             </a:fld>
             <a:endParaRPr lang="zh-TW" altLang="en-US"/>
           </a:p>
@@ -1103,10 +1100,9 @@
           <a:lstStyle/>
           <a:p>
             <a:r>
-              <a:rPr lang="zh-TW" altLang="en-US" smtClean="0"/>
+              <a:rPr lang="zh-TW" altLang="en-US"/>
               <a:t>按一下以編輯母片標題樣式</a:t>
             </a:r>
-            <a:endParaRPr lang="zh-TW" altLang="en-US"/>
           </a:p>
         </p:txBody>
       </p:sp>
@@ -1132,38 +1128,37 @@
           <a:p>
             <a:pPr lvl="0"/>
             <a:r>
-              <a:rPr lang="zh-TW" altLang="en-US" smtClean="0"/>
+              <a:rPr lang="zh-TW" altLang="en-US"/>
               <a:t>編輯母片文字樣式</a:t>
             </a:r>
           </a:p>
           <a:p>
             <a:pPr lvl="1"/>
             <a:r>
-              <a:rPr lang="zh-TW" altLang="en-US" smtClean="0"/>
+              <a:rPr lang="zh-TW" altLang="en-US"/>
               <a:t>第二層</a:t>
             </a:r>
           </a:p>
           <a:p>
             <a:pPr lvl="2"/>
             <a:r>
-              <a:rPr lang="zh-TW" altLang="en-US" smtClean="0"/>
+              <a:rPr lang="zh-TW" altLang="en-US"/>
               <a:t>第三層</a:t>
             </a:r>
           </a:p>
           <a:p>
             <a:pPr lvl="3"/>
             <a:r>
-              <a:rPr lang="zh-TW" altLang="en-US" smtClean="0"/>
+              <a:rPr lang="zh-TW" altLang="en-US"/>
               <a:t>第四層</a:t>
             </a:r>
           </a:p>
           <a:p>
             <a:pPr lvl="4"/>
             <a:r>
-              <a:rPr lang="zh-TW" altLang="en-US" smtClean="0"/>
+              <a:rPr lang="zh-TW" altLang="en-US"/>
               <a:t>第五層</a:t>
             </a:r>
-            <a:endParaRPr lang="zh-TW" altLang="en-US"/>
           </a:p>
         </p:txBody>
       </p:sp>
@@ -1189,38 +1184,37 @@
           <a:p>
             <a:pPr lvl="0"/>
             <a:r>
-              <a:rPr lang="zh-TW" altLang="en-US" smtClean="0"/>
+              <a:rPr lang="zh-TW" altLang="en-US"/>
               <a:t>編輯母片文字樣式</a:t>
             </a:r>
           </a:p>
           <a:p>
             <a:pPr lvl="1"/>
             <a:r>
-              <a:rPr lang="zh-TW" altLang="en-US" smtClean="0"/>
+              <a:rPr lang="zh-TW" altLang="en-US"/>
               <a:t>第二層</a:t>
             </a:r>
           </a:p>
           <a:p>
             <a:pPr lvl="2"/>
             <a:r>
-              <a:rPr lang="zh-TW" altLang="en-US" smtClean="0"/>
+              <a:rPr lang="zh-TW" altLang="en-US"/>
               <a:t>第三層</a:t>
             </a:r>
           </a:p>
           <a:p>
             <a:pPr lvl="3"/>
             <a:r>
-              <a:rPr lang="zh-TW" altLang="en-US" smtClean="0"/>
+              <a:rPr lang="zh-TW" altLang="en-US"/>
               <a:t>第四層</a:t>
             </a:r>
           </a:p>
           <a:p>
             <a:pPr lvl="4"/>
             <a:r>
-              <a:rPr lang="zh-TW" altLang="en-US" smtClean="0"/>
+              <a:rPr lang="zh-TW" altLang="en-US"/>
               <a:t>第五層</a:t>
             </a:r>
-            <a:endParaRPr lang="zh-TW" altLang="en-US"/>
           </a:p>
         </p:txBody>
       </p:sp>
@@ -1241,7 +1235,7 @@
           <a:p>
             <a:fld id="{EBD1E9CA-27D0-485D-BB40-6DD66428CCC0}" type="datetimeFigureOut">
               <a:rPr lang="zh-TW" altLang="en-US" smtClean="0"/>
-              <a:t>2021/2/15</a:t>
+              <a:t>2021/3/5</a:t>
             </a:fld>
             <a:endParaRPr lang="zh-TW" altLang="en-US"/>
           </a:p>
@@ -1340,10 +1334,9 @@
           <a:lstStyle/>
           <a:p>
             <a:r>
-              <a:rPr lang="zh-TW" altLang="en-US" smtClean="0"/>
+              <a:rPr lang="zh-TW" altLang="en-US"/>
               <a:t>按一下以編輯母片標題樣式</a:t>
             </a:r>
-            <a:endParaRPr lang="zh-TW" altLang="en-US"/>
           </a:p>
         </p:txBody>
       </p:sp>
@@ -1406,7 +1399,7 @@
           <a:p>
             <a:pPr lvl="0"/>
             <a:r>
-              <a:rPr lang="zh-TW" altLang="en-US" smtClean="0"/>
+              <a:rPr lang="zh-TW" altLang="en-US"/>
               <a:t>編輯母片文字樣式</a:t>
             </a:r>
           </a:p>
@@ -1434,38 +1427,37 @@
           <a:p>
             <a:pPr lvl="0"/>
             <a:r>
-              <a:rPr lang="zh-TW" altLang="en-US" smtClean="0"/>
+              <a:rPr lang="zh-TW" altLang="en-US"/>
               <a:t>編輯母片文字樣式</a:t>
             </a:r>
           </a:p>
           <a:p>
             <a:pPr lvl="1"/>
             <a:r>
-              <a:rPr lang="zh-TW" altLang="en-US" smtClean="0"/>
+              <a:rPr lang="zh-TW" altLang="en-US"/>
               <a:t>第二層</a:t>
             </a:r>
           </a:p>
           <a:p>
             <a:pPr lvl="2"/>
             <a:r>
-              <a:rPr lang="zh-TW" altLang="en-US" smtClean="0"/>
+              <a:rPr lang="zh-TW" altLang="en-US"/>
               <a:t>第三層</a:t>
             </a:r>
           </a:p>
           <a:p>
             <a:pPr lvl="3"/>
             <a:r>
-              <a:rPr lang="zh-TW" altLang="en-US" smtClean="0"/>
+              <a:rPr lang="zh-TW" altLang="en-US"/>
               <a:t>第四層</a:t>
             </a:r>
           </a:p>
           <a:p>
             <a:pPr lvl="4"/>
             <a:r>
-              <a:rPr lang="zh-TW" altLang="en-US" smtClean="0"/>
+              <a:rPr lang="zh-TW" altLang="en-US"/>
               <a:t>第五層</a:t>
             </a:r>
-            <a:endParaRPr lang="zh-TW" altLang="en-US"/>
           </a:p>
         </p:txBody>
       </p:sp>
@@ -1528,7 +1520,7 @@
           <a:p>
             <a:pPr lvl="0"/>
             <a:r>
-              <a:rPr lang="zh-TW" altLang="en-US" smtClean="0"/>
+              <a:rPr lang="zh-TW" altLang="en-US"/>
               <a:t>編輯母片文字樣式</a:t>
             </a:r>
           </a:p>
@@ -1556,38 +1548,37 @@
           <a:p>
             <a:pPr lvl="0"/>
             <a:r>
-              <a:rPr lang="zh-TW" altLang="en-US" smtClean="0"/>
+              <a:rPr lang="zh-TW" altLang="en-US"/>
               <a:t>編輯母片文字樣式</a:t>
             </a:r>
           </a:p>
           <a:p>
             <a:pPr lvl="1"/>
             <a:r>
-              <a:rPr lang="zh-TW" altLang="en-US" smtClean="0"/>
+              <a:rPr lang="zh-TW" altLang="en-US"/>
               <a:t>第二層</a:t>
             </a:r>
           </a:p>
           <a:p>
             <a:pPr lvl="2"/>
             <a:r>
-              <a:rPr lang="zh-TW" altLang="en-US" smtClean="0"/>
+              <a:rPr lang="zh-TW" altLang="en-US"/>
               <a:t>第三層</a:t>
             </a:r>
           </a:p>
           <a:p>
             <a:pPr lvl="3"/>
             <a:r>
-              <a:rPr lang="zh-TW" altLang="en-US" smtClean="0"/>
+              <a:rPr lang="zh-TW" altLang="en-US"/>
               <a:t>第四層</a:t>
             </a:r>
           </a:p>
           <a:p>
             <a:pPr lvl="4"/>
             <a:r>
-              <a:rPr lang="zh-TW" altLang="en-US" smtClean="0"/>
+              <a:rPr lang="zh-TW" altLang="en-US"/>
               <a:t>第五層</a:t>
             </a:r>
-            <a:endParaRPr lang="zh-TW" altLang="en-US"/>
           </a:p>
         </p:txBody>
       </p:sp>
@@ -1608,7 +1599,7 @@
           <a:p>
             <a:fld id="{EBD1E9CA-27D0-485D-BB40-6DD66428CCC0}" type="datetimeFigureOut">
               <a:rPr lang="zh-TW" altLang="en-US" smtClean="0"/>
-              <a:t>2021/2/15</a:t>
+              <a:t>2021/3/5</a:t>
             </a:fld>
             <a:endParaRPr lang="zh-TW" altLang="en-US"/>
           </a:p>
@@ -1702,10 +1693,9 @@
           <a:lstStyle/>
           <a:p>
             <a:r>
-              <a:rPr lang="zh-TW" altLang="en-US" smtClean="0"/>
+              <a:rPr lang="zh-TW" altLang="en-US"/>
               <a:t>按一下以編輯母片標題樣式</a:t>
             </a:r>
-            <a:endParaRPr lang="zh-TW" altLang="en-US"/>
           </a:p>
         </p:txBody>
       </p:sp>
@@ -1726,7 +1716,7 @@
           <a:p>
             <a:fld id="{EBD1E9CA-27D0-485D-BB40-6DD66428CCC0}" type="datetimeFigureOut">
               <a:rPr lang="zh-TW" altLang="en-US" smtClean="0"/>
-              <a:t>2021/2/15</a:t>
+              <a:t>2021/3/5</a:t>
             </a:fld>
             <a:endParaRPr lang="zh-TW" altLang="en-US"/>
           </a:p>
@@ -1821,7 +1811,7 @@
           <a:p>
             <a:fld id="{EBD1E9CA-27D0-485D-BB40-6DD66428CCC0}" type="datetimeFigureOut">
               <a:rPr lang="zh-TW" altLang="en-US" smtClean="0"/>
-              <a:t>2021/2/15</a:t>
+              <a:t>2021/3/5</a:t>
             </a:fld>
             <a:endParaRPr lang="zh-TW" altLang="en-US"/>
           </a:p>
@@ -1924,10 +1914,9 @@
           </a:lstStyle>
           <a:p>
             <a:r>
-              <a:rPr lang="zh-TW" altLang="en-US" smtClean="0"/>
+              <a:rPr lang="zh-TW" altLang="en-US"/>
               <a:t>按一下以編輯母片標題樣式</a:t>
             </a:r>
-            <a:endParaRPr lang="zh-TW" altLang="en-US"/>
           </a:p>
         </p:txBody>
       </p:sp>
@@ -1981,38 +1970,37 @@
           <a:p>
             <a:pPr lvl="0"/>
             <a:r>
-              <a:rPr lang="zh-TW" altLang="en-US" smtClean="0"/>
+              <a:rPr lang="zh-TW" altLang="en-US"/>
               <a:t>編輯母片文字樣式</a:t>
             </a:r>
           </a:p>
           <a:p>
             <a:pPr lvl="1"/>
             <a:r>
-              <a:rPr lang="zh-TW" altLang="en-US" smtClean="0"/>
+              <a:rPr lang="zh-TW" altLang="en-US"/>
               <a:t>第二層</a:t>
             </a:r>
           </a:p>
           <a:p>
             <a:pPr lvl="2"/>
             <a:r>
-              <a:rPr lang="zh-TW" altLang="en-US" smtClean="0"/>
+              <a:rPr lang="zh-TW" altLang="en-US"/>
               <a:t>第三層</a:t>
             </a:r>
           </a:p>
           <a:p>
             <a:pPr lvl="3"/>
             <a:r>
-              <a:rPr lang="zh-TW" altLang="en-US" smtClean="0"/>
+              <a:rPr lang="zh-TW" altLang="en-US"/>
               <a:t>第四層</a:t>
             </a:r>
           </a:p>
           <a:p>
             <a:pPr lvl="4"/>
             <a:r>
-              <a:rPr lang="zh-TW" altLang="en-US" smtClean="0"/>
+              <a:rPr lang="zh-TW" altLang="en-US"/>
               <a:t>第五層</a:t>
             </a:r>
-            <a:endParaRPr lang="zh-TW" altLang="en-US"/>
           </a:p>
         </p:txBody>
       </p:sp>
@@ -2075,7 +2063,7 @@
           <a:p>
             <a:pPr lvl="0"/>
             <a:r>
-              <a:rPr lang="zh-TW" altLang="en-US" smtClean="0"/>
+              <a:rPr lang="zh-TW" altLang="en-US"/>
               <a:t>編輯母片文字樣式</a:t>
             </a:r>
           </a:p>
@@ -2098,7 +2086,7 @@
           <a:p>
             <a:fld id="{EBD1E9CA-27D0-485D-BB40-6DD66428CCC0}" type="datetimeFigureOut">
               <a:rPr lang="zh-TW" altLang="en-US" smtClean="0"/>
-              <a:t>2021/2/15</a:t>
+              <a:t>2021/3/5</a:t>
             </a:fld>
             <a:endParaRPr lang="zh-TW" altLang="en-US"/>
           </a:p>
@@ -2201,10 +2189,9 @@
           </a:lstStyle>
           <a:p>
             <a:r>
-              <a:rPr lang="zh-TW" altLang="en-US" smtClean="0"/>
+              <a:rPr lang="zh-TW" altLang="en-US"/>
               <a:t>按一下以編輯母片標題樣式</a:t>
             </a:r>
-            <a:endParaRPr lang="zh-TW" altLang="en-US"/>
           </a:p>
         </p:txBody>
       </p:sp>
@@ -2328,7 +2315,7 @@
           <a:p>
             <a:pPr lvl="0"/>
             <a:r>
-              <a:rPr lang="zh-TW" altLang="en-US" smtClean="0"/>
+              <a:rPr lang="zh-TW" altLang="en-US"/>
               <a:t>編輯母片文字樣式</a:t>
             </a:r>
           </a:p>
@@ -2351,7 +2338,7 @@
           <a:p>
             <a:fld id="{EBD1E9CA-27D0-485D-BB40-6DD66428CCC0}" type="datetimeFigureOut">
               <a:rPr lang="zh-TW" altLang="en-US" smtClean="0"/>
-              <a:t>2021/2/15</a:t>
+              <a:t>2021/3/5</a:t>
             </a:fld>
             <a:endParaRPr lang="zh-TW" altLang="en-US"/>
           </a:p>
@@ -2460,10 +2447,9 @@
           <a:lstStyle/>
           <a:p>
             <a:r>
-              <a:rPr lang="zh-TW" altLang="en-US" smtClean="0"/>
+              <a:rPr lang="zh-TW" altLang="en-US"/>
               <a:t>按一下以編輯母片標題樣式</a:t>
             </a:r>
-            <a:endParaRPr lang="zh-TW" altLang="en-US"/>
           </a:p>
         </p:txBody>
       </p:sp>
@@ -2494,38 +2480,37 @@
           <a:p>
             <a:pPr lvl="0"/>
             <a:r>
-              <a:rPr lang="zh-TW" altLang="en-US" smtClean="0"/>
+              <a:rPr lang="zh-TW" altLang="en-US"/>
               <a:t>編輯母片文字樣式</a:t>
             </a:r>
           </a:p>
           <a:p>
             <a:pPr lvl="1"/>
             <a:r>
-              <a:rPr lang="zh-TW" altLang="en-US" smtClean="0"/>
+              <a:rPr lang="zh-TW" altLang="en-US"/>
               <a:t>第二層</a:t>
             </a:r>
           </a:p>
           <a:p>
             <a:pPr lvl="2"/>
             <a:r>
-              <a:rPr lang="zh-TW" altLang="en-US" smtClean="0"/>
+              <a:rPr lang="zh-TW" altLang="en-US"/>
               <a:t>第三層</a:t>
             </a:r>
           </a:p>
           <a:p>
             <a:pPr lvl="3"/>
             <a:r>
-              <a:rPr lang="zh-TW" altLang="en-US" smtClean="0"/>
+              <a:rPr lang="zh-TW" altLang="en-US"/>
               <a:t>第四層</a:t>
             </a:r>
           </a:p>
           <a:p>
             <a:pPr lvl="4"/>
             <a:r>
-              <a:rPr lang="zh-TW" altLang="en-US" smtClean="0"/>
+              <a:rPr lang="zh-TW" altLang="en-US"/>
               <a:t>第五層</a:t>
             </a:r>
-            <a:endParaRPr lang="zh-TW" altLang="en-US"/>
           </a:p>
         </p:txBody>
       </p:sp>
@@ -2564,7 +2549,7 @@
           <a:p>
             <a:fld id="{EBD1E9CA-27D0-485D-BB40-6DD66428CCC0}" type="datetimeFigureOut">
               <a:rPr lang="zh-TW" altLang="en-US" smtClean="0"/>
-              <a:t>2021/2/15</a:t>
+              <a:t>2021/3/5</a:t>
             </a:fld>
             <a:endParaRPr lang="zh-TW" altLang="en-US"/>
           </a:p>
@@ -2985,7 +2970,7 @@
           <a:lstStyle/>
           <a:p>
             <a:r>
-              <a:rPr lang="en-US" altLang="zh-CN" dirty="0" smtClean="0"/>
+              <a:rPr lang="en-US" altLang="zh-CN" dirty="0"/>
               <a:t>MicasenseMX30API</a:t>
             </a:r>
             <a:endParaRPr lang="zh-TW" altLang="en-US" dirty="0"/>
@@ -3062,11 +3047,11 @@
           <a:lstStyle/>
           <a:p>
             <a:r>
-              <a:rPr lang="en-US" altLang="zh-CN" dirty="0" err="1" smtClean="0"/>
+              <a:rPr lang="en-US" altLang="zh-CN" dirty="0" err="1"/>
               <a:t>c</a:t>
             </a:r>
             <a:r>
-              <a:rPr lang="en-US" altLang="zh-TW" dirty="0" err="1" smtClean="0"/>
+              <a:rPr lang="en-US" altLang="zh-TW" dirty="0" err="1"/>
               <a:t>alallignment</a:t>
             </a:r>
             <a:endParaRPr lang="zh-TW" altLang="en-US" dirty="0"/>
@@ -3094,57 +3079,72 @@
           <a:lstStyle/>
           <a:p>
             <a:r>
-              <a:rPr lang="zh-CN" altLang="en-US" dirty="0" smtClean="0"/>
+              <a:rPr lang="zh-TW" altLang="en-US" b="1" dirty="0"/>
+              <a:t> </a:t>
+            </a:r>
+            <a:r>
+              <a:rPr lang="zh-TW" altLang="en-US" dirty="0"/>
+              <a:t>遙測影像</a:t>
+            </a:r>
+            <a:r>
+              <a:rPr lang="zh-CN" altLang="en-US" dirty="0"/>
               <a:t>計算</a:t>
             </a:r>
             <a:r>
-              <a:rPr lang="en-US" altLang="zh-CN" dirty="0" smtClean="0"/>
-              <a:t>alignment</a:t>
-            </a:r>
-            <a:r>
-              <a:rPr lang="en-US" altLang="zh-CN" dirty="0" smtClean="0"/>
-              <a:t> matrix</a:t>
-            </a:r>
-          </a:p>
-          <a:p>
-            <a:r>
-              <a:rPr lang="en-US" altLang="zh-CN" dirty="0" err="1" smtClean="0"/>
+              <a:rPr lang="en-US" altLang="zh-CN" dirty="0"/>
+              <a:t>alignment matrix</a:t>
+            </a:r>
+          </a:p>
+          <a:p>
+            <a:r>
+              <a:rPr lang="en-US" altLang="zh-CN" dirty="0" err="1"/>
               <a:t>Method:POST</a:t>
             </a:r>
-            <a:endParaRPr lang="en-US" altLang="zh-CN" dirty="0" smtClean="0"/>
-          </a:p>
-          <a:p>
-            <a:r>
-              <a:rPr lang="en-US" altLang="zh-CN" dirty="0" smtClean="0"/>
+            <a:endParaRPr lang="en-US" altLang="zh-CN" dirty="0"/>
+          </a:p>
+          <a:p>
+            <a:r>
+              <a:rPr lang="en-US" altLang="zh-CN" dirty="0"/>
               <a:t>Input :5 </a:t>
             </a:r>
             <a:r>
-              <a:rPr lang="zh-CN" altLang="en-US" dirty="0" smtClean="0"/>
+              <a:rPr lang="zh-CN" altLang="en-US" dirty="0"/>
               <a:t>個</a:t>
             </a:r>
             <a:r>
-              <a:rPr lang="en-US" altLang="zh-CN" dirty="0" smtClean="0"/>
+              <a:rPr lang="en-US" altLang="zh-CN" dirty="0"/>
               <a:t>band </a:t>
             </a:r>
             <a:r>
-              <a:rPr lang="zh-CN" altLang="en-US" dirty="0" smtClean="0"/>
-              <a:t>影像下載點</a:t>
-            </a:r>
-            <a:endParaRPr lang="en-US" altLang="zh-CN" dirty="0" smtClean="0"/>
-          </a:p>
-          <a:p>
-            <a:endParaRPr lang="en-US" altLang="zh-CN" dirty="0" smtClean="0"/>
-          </a:p>
-          <a:p>
-            <a:endParaRPr lang="en-US" altLang="zh-TW" dirty="0" smtClean="0"/>
-          </a:p>
-          <a:p>
-            <a:r>
-              <a:rPr lang="en-US" altLang="zh-CN" dirty="0" smtClean="0"/>
+              <a:rPr lang="zh-CN" altLang="en-US" dirty="0"/>
+              <a:t>影像下載點及</a:t>
+            </a:r>
+            <a:r>
+              <a:rPr lang="en-US" altLang="zh-CN" dirty="0" err="1"/>
+              <a:t>maxiteration</a:t>
+            </a:r>
+            <a:r>
+              <a:rPr lang="en-US" altLang="zh-CN" dirty="0"/>
+              <a:t>(optional)</a:t>
+            </a:r>
+          </a:p>
+          <a:p>
+            <a:pPr marL="914400" lvl="2" indent="0">
+              <a:buNone/>
+            </a:pPr>
+            <a:r>
+              <a:rPr lang="en-US" altLang="zh-CN" dirty="0"/>
+              <a:t> </a:t>
+            </a:r>
+            <a:endParaRPr lang="en-US" altLang="zh-TW" dirty="0"/>
+          </a:p>
+          <a:p>
+            <a:r>
+              <a:rPr lang="en-US" altLang="zh-CN" dirty="0"/>
               <a:t>Output: </a:t>
             </a:r>
             <a:r>
-              <a:rPr lang="en-US" altLang="zh-CN" dirty="0" err="1" smtClean="0"/>
+              <a:rPr lang="en-US" altLang="zh-CN" dirty="0" err="1"/>
               <a:t>alignmat</a:t>
             </a:r>
             <a:endParaRPr lang="zh-TW" altLang="en-US" dirty="0"/>
@@ -3205,6 +3205,30 @@
           <a:chExt cx="0" cy="0"/>
         </a:xfrm>
       </p:grpSpPr>
+      <p:pic>
+        <p:nvPicPr>
+          <p:cNvPr id="4" name="圖片 3"/>
+          <p:cNvPicPr>
+            <a:picLocks noChangeAspect="1"/>
+          </p:cNvPicPr>
+          <p:nvPr/>
+        </p:nvPicPr>
+        <p:blipFill>
+          <a:blip r:embed="rId2"/>
+          <a:stretch>
+            <a:fillRect/>
+          </a:stretch>
+        </p:blipFill>
+        <p:spPr>
+          <a:xfrm>
+            <a:off x="5958840" y="848680"/>
+            <a:ext cx="5679136" cy="2978979"/>
+          </a:xfrm>
+          <a:prstGeom prst="rect">
+            <a:avLst/>
+          </a:prstGeom>
+        </p:spPr>
+      </p:pic>
       <p:sp>
         <p:nvSpPr>
           <p:cNvPr id="2" name="標題 1"/>
@@ -3221,7 +3245,170 @@
           <a:lstStyle/>
           <a:p>
             <a:r>
-              <a:rPr lang="en-US" altLang="zh-TW" dirty="0" err="1" smtClean="0"/>
+              <a:rPr lang="en-US" altLang="zh-CN" dirty="0"/>
+              <a:t>c</a:t>
+            </a:r>
+            <a:r>
+              <a:rPr lang="en-US" altLang="zh-TW" dirty="0"/>
+              <a:t>alallignment</a:t>
+            </a:r>
+            <a:r>
+              <a:rPr lang="en-US" altLang="zh-CN" dirty="0"/>
+              <a:t>2</a:t>
+            </a:r>
+            <a:endParaRPr lang="zh-TW" altLang="en-US" dirty="0"/>
+          </a:p>
+        </p:txBody>
+      </p:sp>
+      <p:sp>
+        <p:nvSpPr>
+          <p:cNvPr id="3" name="內容版面配置區 2"/>
+          <p:cNvSpPr>
+            <a:spLocks noGrp="1"/>
+          </p:cNvSpPr>
+          <p:nvPr>
+            <p:ph idx="1"/>
+          </p:nvPr>
+        </p:nvSpPr>
+        <p:spPr>
+          <a:xfrm>
+            <a:off x="838200" y="1825625"/>
+            <a:ext cx="5679136" cy="4351338"/>
+          </a:xfrm>
+        </p:spPr>
+        <p:txBody>
+          <a:bodyPr/>
+          <a:lstStyle/>
+          <a:p>
+            <a:r>
+              <a:rPr lang="zh-TW" altLang="en-US" dirty="0"/>
+              <a:t>近景攝影</a:t>
+            </a:r>
+            <a:r>
+              <a:rPr lang="zh-CN" altLang="en-US" dirty="0"/>
+              <a:t>計算</a:t>
+            </a:r>
+            <a:r>
+              <a:rPr lang="en-US" altLang="zh-CN" dirty="0"/>
+              <a:t>alignment matrix</a:t>
+            </a:r>
+          </a:p>
+          <a:p>
+            <a:r>
+              <a:rPr lang="en-US" altLang="zh-CN" dirty="0" err="1"/>
+              <a:t>Method:POST</a:t>
+            </a:r>
+            <a:endParaRPr lang="en-US" altLang="zh-CN" dirty="0"/>
+          </a:p>
+          <a:p>
+            <a:r>
+              <a:rPr lang="en-US" altLang="zh-CN" dirty="0"/>
+              <a:t>Input :5 </a:t>
+            </a:r>
+            <a:r>
+              <a:rPr lang="zh-CN" altLang="en-US" dirty="0"/>
+              <a:t>個</a:t>
+            </a:r>
+            <a:r>
+              <a:rPr lang="en-US" altLang="zh-CN" dirty="0"/>
+              <a:t>band </a:t>
+            </a:r>
+            <a:r>
+              <a:rPr lang="zh-CN" altLang="en-US" dirty="0"/>
+              <a:t>影像下載點</a:t>
+            </a:r>
+            <a:endParaRPr lang="en-US" altLang="zh-CN" dirty="0"/>
+          </a:p>
+          <a:p>
+            <a:endParaRPr lang="en-US" altLang="zh-CN" dirty="0"/>
+          </a:p>
+          <a:p>
+            <a:endParaRPr lang="en-US" altLang="zh-TW" dirty="0"/>
+          </a:p>
+          <a:p>
+            <a:r>
+              <a:rPr lang="en-US" altLang="zh-CN" dirty="0"/>
+              <a:t>Output: </a:t>
+            </a:r>
+            <a:r>
+              <a:rPr lang="en-US" altLang="zh-CN" dirty="0" err="1"/>
+              <a:t>alignmat</a:t>
+            </a:r>
+            <a:endParaRPr lang="zh-TW" altLang="en-US" dirty="0"/>
+          </a:p>
+        </p:txBody>
+      </p:sp>
+      <p:pic>
+        <p:nvPicPr>
+          <p:cNvPr id="5" name="圖片 4"/>
+          <p:cNvPicPr>
+            <a:picLocks noChangeAspect="1"/>
+          </p:cNvPicPr>
+          <p:nvPr/>
+        </p:nvPicPr>
+        <p:blipFill>
+          <a:blip r:embed="rId3"/>
+          <a:stretch>
+            <a:fillRect/>
+          </a:stretch>
+        </p:blipFill>
+        <p:spPr>
+          <a:xfrm>
+            <a:off x="0" y="4965895"/>
+            <a:ext cx="11353800" cy="1628605"/>
+          </a:xfrm>
+          <a:prstGeom prst="rect">
+            <a:avLst/>
+          </a:prstGeom>
+        </p:spPr>
+      </p:pic>
+    </p:spTree>
+    <p:extLst>
+      <p:ext uri="{BB962C8B-B14F-4D97-AF65-F5344CB8AC3E}">
+        <p14:creationId xmlns:p14="http://schemas.microsoft.com/office/powerpoint/2010/main" val="4143701089"/>
+      </p:ext>
+    </p:extLst>
+  </p:cSld>
+  <p:clrMapOvr>
+    <a:masterClrMapping/>
+  </p:clrMapOvr>
+</p:sld>
+</file>
+
+<file path=ppt/slides/slide4.xml><?xml version="1.0" encoding="utf-8"?>
+<p:sld xmlns:a="http://schemas.openxmlformats.org/drawingml/2006/main" xmlns:r="http://schemas.openxmlformats.org/officeDocument/2006/relationships" xmlns:p="http://schemas.openxmlformats.org/presentationml/2006/main">
+  <p:cSld>
+    <p:spTree>
+      <p:nvGrpSpPr>
+        <p:cNvPr id="1" name=""/>
+        <p:cNvGrpSpPr/>
+        <p:nvPr/>
+      </p:nvGrpSpPr>
+      <p:grpSpPr>
+        <a:xfrm>
+          <a:off x="0" y="0"/>
+          <a:ext cx="0" cy="0"/>
+          <a:chOff x="0" y="0"/>
+          <a:chExt cx="0" cy="0"/>
+        </a:xfrm>
+      </p:grpSpPr>
+      <p:sp>
+        <p:nvSpPr>
+          <p:cNvPr id="2" name="標題 1"/>
+          <p:cNvSpPr>
+            <a:spLocks noGrp="1"/>
+          </p:cNvSpPr>
+          <p:nvPr>
+            <p:ph type="title"/>
+          </p:nvPr>
+        </p:nvSpPr>
+        <p:spPr/>
+        <p:txBody>
+          <a:bodyPr/>
+          <a:lstStyle/>
+          <a:p>
+            <a:r>
+              <a:rPr lang="en-US" altLang="zh-TW" dirty="0" err="1"/>
               <a:t>allignment</a:t>
             </a:r>
             <a:endParaRPr lang="zh-TW" altLang="en-US" dirty="0"/>
@@ -3244,69 +3431,65 @@
           <a:lstStyle/>
           <a:p>
             <a:r>
-              <a:rPr lang="zh-CN" altLang="en-US" dirty="0" smtClean="0"/>
+              <a:rPr lang="zh-CN" altLang="en-US" dirty="0"/>
               <a:t>對影像做</a:t>
             </a:r>
             <a:r>
-              <a:rPr lang="en-US" altLang="zh-CN" dirty="0" err="1" smtClean="0"/>
+              <a:rPr lang="en-US" altLang="zh-CN" dirty="0" err="1"/>
               <a:t>allignment</a:t>
             </a:r>
-            <a:endParaRPr lang="en-US" altLang="zh-CN" dirty="0" smtClean="0"/>
-          </a:p>
-          <a:p>
-            <a:r>
-              <a:rPr lang="en-US" altLang="zh-CN" dirty="0" err="1" smtClean="0"/>
+            <a:endParaRPr lang="en-US" altLang="zh-CN" dirty="0"/>
+          </a:p>
+          <a:p>
+            <a:r>
+              <a:rPr lang="en-US" altLang="zh-CN" dirty="0" err="1"/>
               <a:t>Method:POST</a:t>
             </a:r>
-            <a:endParaRPr lang="en-US" altLang="zh-CN" dirty="0" smtClean="0"/>
-          </a:p>
-          <a:p>
-            <a:r>
-              <a:rPr lang="en-US" altLang="zh-CN" dirty="0" smtClean="0"/>
+            <a:endParaRPr lang="en-US" altLang="zh-CN" dirty="0"/>
+          </a:p>
+          <a:p>
+            <a:r>
+              <a:rPr lang="en-US" altLang="zh-CN" dirty="0"/>
               <a:t>Input :5 </a:t>
             </a:r>
             <a:r>
-              <a:rPr lang="zh-CN" altLang="en-US" dirty="0" smtClean="0"/>
+              <a:rPr lang="zh-CN" altLang="en-US" dirty="0"/>
               <a:t>個</a:t>
             </a:r>
             <a:r>
-              <a:rPr lang="en-US" altLang="zh-CN" dirty="0" smtClean="0"/>
+              <a:rPr lang="en-US" altLang="zh-CN" dirty="0"/>
               <a:t>band </a:t>
             </a:r>
             <a:r>
-              <a:rPr lang="zh-CN" altLang="en-US" dirty="0" smtClean="0"/>
+              <a:rPr lang="zh-CN" altLang="en-US" dirty="0"/>
               <a:t>影像下載點</a:t>
             </a:r>
-            <a:r>
-              <a:rPr lang="en-US" altLang="zh-CN" dirty="0" smtClean="0"/>
-              <a:t/>
-            </a:r>
             <a:br>
-              <a:rPr lang="en-US" altLang="zh-CN" dirty="0" smtClean="0"/>
+              <a:rPr lang="en-US" altLang="zh-CN" dirty="0"/>
             </a:br>
             <a:r>
-              <a:rPr lang="zh-CN" altLang="en-US" dirty="0" smtClean="0"/>
+              <a:rPr lang="zh-CN" altLang="en-US" dirty="0"/>
               <a:t>及</a:t>
             </a:r>
             <a:r>
-              <a:rPr lang="en-US" altLang="zh-CN" dirty="0" err="1" smtClean="0"/>
+              <a:rPr lang="en-US" altLang="zh-CN" dirty="0" err="1"/>
               <a:t>allignmat</a:t>
             </a:r>
             <a:endParaRPr lang="en-US" altLang="zh-CN" dirty="0"/>
           </a:p>
           <a:p>
             <a:r>
-              <a:rPr lang="en-US" altLang="zh-CN" dirty="0" smtClean="0"/>
+              <a:rPr lang="en-US" altLang="zh-CN" dirty="0"/>
               <a:t>Output:</a:t>
             </a:r>
             <a:r>
-              <a:rPr lang="zh-CN" altLang="en-US" dirty="0" smtClean="0"/>
+              <a:rPr lang="zh-CN" altLang="en-US" dirty="0"/>
               <a:t>結果下載鏈接</a:t>
             </a:r>
-            <a:endParaRPr lang="en-US" altLang="zh-CN" dirty="0" smtClean="0"/>
-          </a:p>
-          <a:p>
-            <a:endParaRPr lang="en-US" altLang="zh-CN" dirty="0" smtClean="0"/>
+            <a:endParaRPr lang="en-US" altLang="zh-CN" dirty="0"/>
+          </a:p>
+          <a:p>
+            <a:endParaRPr lang="en-US" altLang="zh-CN" dirty="0"/>
           </a:p>
           <a:p>
             <a:endParaRPr lang="zh-TW" altLang="en-US" dirty="0"/>
@@ -3374,7 +3557,7 @@
 </p:sld>
 </file>
 
-<file path=ppt/slides/slide4.xml><?xml version="1.0" encoding="utf-8"?>
+<file path=ppt/slides/slide5.xml><?xml version="1.0" encoding="utf-8"?>
 <p:sld xmlns:a="http://schemas.openxmlformats.org/drawingml/2006/main" xmlns:r="http://schemas.openxmlformats.org/officeDocument/2006/relationships" xmlns:p="http://schemas.openxmlformats.org/presentationml/2006/main">
   <p:cSld>
     <p:spTree>
@@ -3432,11 +3615,7 @@
           <a:p>
             <a:r>
               <a:rPr lang="en-US" altLang="zh-CN" dirty="0" err="1"/>
-              <a:t>c</a:t>
-            </a:r>
-            <a:r>
-              <a:rPr lang="en-US" altLang="zh-CN" dirty="0" err="1" smtClean="0"/>
-              <a:t>al</a:t>
+              <a:t>cal</a:t>
             </a:r>
             <a:endParaRPr lang="zh-TW" altLang="en-US" dirty="0"/>
           </a:p>
@@ -3458,111 +3637,103 @@
           <a:lstStyle/>
           <a:p>
             <a:r>
-              <a:rPr lang="zh-CN" altLang="en-US" dirty="0" smtClean="0"/>
+              <a:rPr lang="zh-CN" altLang="en-US" dirty="0"/>
               <a:t>計算指標</a:t>
             </a:r>
-            <a:endParaRPr lang="en-US" altLang="zh-CN" dirty="0" smtClean="0"/>
-          </a:p>
-          <a:p>
-            <a:r>
-              <a:rPr lang="en-US" altLang="zh-CN" dirty="0" err="1" smtClean="0"/>
+            <a:endParaRPr lang="en-US" altLang="zh-CN" dirty="0"/>
+          </a:p>
+          <a:p>
+            <a:r>
+              <a:rPr lang="en-US" altLang="zh-CN" dirty="0" err="1"/>
               <a:t>Method:POST</a:t>
             </a:r>
-            <a:endParaRPr lang="en-US" altLang="zh-CN" dirty="0" smtClean="0"/>
-          </a:p>
-          <a:p>
-            <a:r>
-              <a:rPr lang="en-US" altLang="zh-CN" dirty="0" smtClean="0"/>
+            <a:endParaRPr lang="en-US" altLang="zh-CN" dirty="0"/>
+          </a:p>
+          <a:p>
+            <a:r>
+              <a:rPr lang="en-US" altLang="zh-CN" dirty="0"/>
               <a:t>Input :5 </a:t>
             </a:r>
             <a:r>
-              <a:rPr lang="zh-CN" altLang="en-US" dirty="0" smtClean="0"/>
+              <a:rPr lang="zh-CN" altLang="en-US" dirty="0"/>
               <a:t>個</a:t>
             </a:r>
             <a:r>
-              <a:rPr lang="en-US" altLang="zh-CN" dirty="0" smtClean="0"/>
+              <a:rPr lang="en-US" altLang="zh-CN" dirty="0"/>
               <a:t>band </a:t>
             </a:r>
             <a:r>
-              <a:rPr lang="zh-CN" altLang="en-US" dirty="0" smtClean="0"/>
+              <a:rPr lang="zh-CN" altLang="en-US" dirty="0"/>
               <a:t>影像下載點</a:t>
-            </a:r>
-            <a:r>
-              <a:rPr lang="en-US" altLang="zh-CN" dirty="0" smtClean="0"/>
-              <a:t/>
-            </a:r>
-            <a:br>
-              <a:rPr lang="en-US" altLang="zh-CN" dirty="0" smtClean="0"/>
-            </a:br>
-            <a:r>
-              <a:rPr lang="zh-CN" altLang="en-US" dirty="0" smtClean="0"/>
-              <a:t>及</a:t>
-            </a:r>
-            <a:r>
-              <a:rPr lang="en-US" altLang="zh-CN" dirty="0" smtClean="0"/>
-              <a:t>ops, ops </a:t>
-            </a:r>
-            <a:r>
-              <a:rPr lang="zh-CN" altLang="en-US" dirty="0" smtClean="0"/>
-              <a:t>為需計算的動作之陣列</a:t>
-            </a:r>
-            <a:r>
-              <a:rPr lang="en-US" altLang="zh-CN" dirty="0"/>
-              <a:t/>
             </a:r>
             <a:br>
               <a:rPr lang="en-US" altLang="zh-CN" dirty="0"/>
             </a:br>
             <a:r>
-              <a:rPr lang="zh-CN" altLang="en-US" dirty="0" smtClean="0"/>
+              <a:rPr lang="zh-CN" altLang="en-US" dirty="0"/>
+              <a:t>及</a:t>
+            </a:r>
+            <a:r>
+              <a:rPr lang="en-US" altLang="zh-CN" dirty="0"/>
+              <a:t>ops, ops </a:t>
+            </a:r>
+            <a:r>
+              <a:rPr lang="zh-CN" altLang="en-US" dirty="0"/>
+              <a:t>為需計算的動作之陣列</a:t>
+            </a:r>
+            <a:br>
+              <a:rPr lang="en-US" altLang="zh-CN" dirty="0"/>
+            </a:br>
+            <a:r>
+              <a:rPr lang="zh-CN" altLang="en-US" dirty="0"/>
               <a:t>，含</a:t>
             </a:r>
             <a:r>
-              <a:rPr lang="en-US" altLang="zh-CN" dirty="0" err="1" smtClean="0"/>
+              <a:rPr lang="en-US" altLang="zh-CN" dirty="0" err="1"/>
               <a:t>nbi,ndvi,cir,rgb,tgi</a:t>
             </a:r>
             <a:r>
-              <a:rPr lang="zh-CN" altLang="en-US" dirty="0" smtClean="0"/>
+              <a:rPr lang="zh-CN" altLang="en-US" dirty="0"/>
               <a:t>。可多個</a:t>
             </a:r>
             <a:r>
-              <a:rPr lang="en-US" altLang="zh-CN" dirty="0" smtClean="0"/>
+              <a:rPr lang="en-US" altLang="zh-CN" dirty="0"/>
               <a:t>ops </a:t>
             </a:r>
             <a:r>
-              <a:rPr lang="zh-CN" altLang="en-US" dirty="0" smtClean="0"/>
+              <a:rPr lang="zh-CN" altLang="en-US" dirty="0"/>
               <a:t>一起呼叫，也可以個別呼叫</a:t>
             </a:r>
-            <a:endParaRPr lang="en-US" altLang="zh-CN" dirty="0" smtClean="0"/>
-          </a:p>
-          <a:p>
-            <a:r>
-              <a:rPr lang="en-US" altLang="zh-CN" dirty="0" err="1" smtClean="0"/>
+            <a:endParaRPr lang="en-US" altLang="zh-CN" dirty="0"/>
+          </a:p>
+          <a:p>
+            <a:r>
+              <a:rPr lang="en-US" altLang="zh-CN" dirty="0" err="1"/>
               <a:t>Ouput</a:t>
             </a:r>
             <a:r>
-              <a:rPr lang="en-US" altLang="zh-CN" dirty="0" smtClean="0"/>
+              <a:rPr lang="en-US" altLang="zh-CN" dirty="0"/>
               <a:t>: </a:t>
             </a:r>
             <a:r>
-              <a:rPr lang="zh-CN" altLang="en-US" dirty="0" smtClean="0"/>
+              <a:rPr lang="zh-CN" altLang="en-US" dirty="0"/>
               <a:t>各個</a:t>
             </a:r>
             <a:r>
-              <a:rPr lang="en-US" altLang="zh-CN" dirty="0" smtClean="0"/>
+              <a:rPr lang="en-US" altLang="zh-CN" dirty="0"/>
               <a:t>ops</a:t>
             </a:r>
             <a:r>
-              <a:rPr lang="zh-CN" altLang="en-US" dirty="0" smtClean="0"/>
+              <a:rPr lang="zh-CN" altLang="en-US" dirty="0"/>
               <a:t>結果之下載鏈接</a:t>
             </a:r>
-            <a:endParaRPr lang="en-US" altLang="zh-CN" dirty="0" smtClean="0"/>
-          </a:p>
-          <a:p>
-            <a:endParaRPr lang="en-US" altLang="zh-CN" dirty="0" smtClean="0"/>
-          </a:p>
-          <a:p>
-            <a:endParaRPr lang="en-US" altLang="zh-CN" dirty="0" smtClean="0"/>
+            <a:endParaRPr lang="en-US" altLang="zh-CN" dirty="0"/>
+          </a:p>
+          <a:p>
+            <a:endParaRPr lang="en-US" altLang="zh-CN" dirty="0"/>
+          </a:p>
+          <a:p>
+            <a:endParaRPr lang="en-US" altLang="zh-CN" dirty="0"/>
           </a:p>
         </p:txBody>
       </p:sp>
@@ -3603,104 +3774,6 @@
 </p:sld>
 </file>
 
-<file path=ppt/slides/slide5.xml><?xml version="1.0" encoding="utf-8"?>
-<p:sld xmlns:a="http://schemas.openxmlformats.org/drawingml/2006/main" xmlns:r="http://schemas.openxmlformats.org/officeDocument/2006/relationships" xmlns:p="http://schemas.openxmlformats.org/presentationml/2006/main">
-  <p:cSld>
-    <p:spTree>
-      <p:nvGrpSpPr>
-        <p:cNvPr id="1" name=""/>
-        <p:cNvGrpSpPr/>
-        <p:nvPr/>
-      </p:nvGrpSpPr>
-      <p:grpSpPr>
-        <a:xfrm>
-          <a:off x="0" y="0"/>
-          <a:ext cx="0" cy="0"/>
-          <a:chOff x="0" y="0"/>
-          <a:chExt cx="0" cy="0"/>
-        </a:xfrm>
-      </p:grpSpPr>
-      <p:sp>
-        <p:nvSpPr>
-          <p:cNvPr id="2" name="標題 1"/>
-          <p:cNvSpPr>
-            <a:spLocks noGrp="1"/>
-          </p:cNvSpPr>
-          <p:nvPr>
-            <p:ph type="title"/>
-          </p:nvPr>
-        </p:nvSpPr>
-        <p:spPr/>
-        <p:txBody>
-          <a:bodyPr/>
-          <a:lstStyle/>
-          <a:p>
-            <a:r>
-              <a:rPr lang="en-US" altLang="zh-TW" dirty="0"/>
-              <a:t>d</a:t>
-            </a:r>
-            <a:r>
-              <a:rPr lang="en-US" altLang="zh-TW" dirty="0" smtClean="0"/>
-              <a:t>ownload/&lt;filename&gt;</a:t>
-            </a:r>
-            <a:endParaRPr lang="zh-TW" altLang="en-US" dirty="0"/>
-          </a:p>
-        </p:txBody>
-      </p:sp>
-      <p:sp>
-        <p:nvSpPr>
-          <p:cNvPr id="3" name="內容版面配置區 2"/>
-          <p:cNvSpPr>
-            <a:spLocks noGrp="1"/>
-          </p:cNvSpPr>
-          <p:nvPr>
-            <p:ph idx="1"/>
-          </p:nvPr>
-        </p:nvSpPr>
-        <p:spPr/>
-        <p:txBody>
-          <a:bodyPr/>
-          <a:lstStyle/>
-          <a:p>
-            <a:r>
-              <a:rPr lang="zh-CN" altLang="en-US" dirty="0" smtClean="0"/>
-              <a:t>下載</a:t>
-            </a:r>
-            <a:r>
-              <a:rPr lang="zh-CN" altLang="en-US" dirty="0" smtClean="0"/>
-              <a:t>或刪除</a:t>
-            </a:r>
-            <a:r>
-              <a:rPr lang="en-US" altLang="zh-CN" dirty="0" smtClean="0"/>
-              <a:t>cache</a:t>
-            </a:r>
-            <a:r>
-              <a:rPr lang="zh-CN" altLang="en-US" dirty="0" smtClean="0"/>
-              <a:t>的影像</a:t>
-            </a:r>
-            <a:endParaRPr lang="en-US" altLang="zh-CN" dirty="0" smtClean="0"/>
-          </a:p>
-          <a:p>
-            <a:r>
-              <a:rPr lang="en-US" altLang="zh-CN" dirty="0" smtClean="0"/>
-              <a:t>Method: POST, GET, DELETE</a:t>
-            </a:r>
-          </a:p>
-        </p:txBody>
-      </p:sp>
-    </p:spTree>
-    <p:extLst>
-      <p:ext uri="{BB962C8B-B14F-4D97-AF65-F5344CB8AC3E}">
-        <p14:creationId xmlns:p14="http://schemas.microsoft.com/office/powerpoint/2010/main" val="2988508316"/>
-      </p:ext>
-    </p:extLst>
-  </p:cSld>
-  <p:clrMapOvr>
-    <a:masterClrMapping/>
-  </p:clrMapOvr>
-</p:sld>
-</file>
-
 <file path=ppt/slides/slide6.xml><?xml version="1.0" encoding="utf-8"?>
 <p:sld xmlns:a="http://schemas.openxmlformats.org/drawingml/2006/main" xmlns:r="http://schemas.openxmlformats.org/officeDocument/2006/relationships" xmlns:p="http://schemas.openxmlformats.org/presentationml/2006/main">
   <p:cSld>
@@ -3734,7 +3807,97 @@
           <a:lstStyle/>
           <a:p>
             <a:r>
-              <a:rPr lang="zh-CN" altLang="en-US" dirty="0" smtClean="0"/>
+              <a:rPr lang="en-US" altLang="zh-TW" dirty="0"/>
+              <a:t>download/&lt;filename&gt;</a:t>
+            </a:r>
+            <a:endParaRPr lang="zh-TW" altLang="en-US" dirty="0"/>
+          </a:p>
+        </p:txBody>
+      </p:sp>
+      <p:sp>
+        <p:nvSpPr>
+          <p:cNvPr id="3" name="內容版面配置區 2"/>
+          <p:cNvSpPr>
+            <a:spLocks noGrp="1"/>
+          </p:cNvSpPr>
+          <p:nvPr>
+            <p:ph idx="1"/>
+          </p:nvPr>
+        </p:nvSpPr>
+        <p:spPr/>
+        <p:txBody>
+          <a:bodyPr/>
+          <a:lstStyle/>
+          <a:p>
+            <a:r>
+              <a:rPr lang="zh-CN" altLang="en-US" dirty="0"/>
+              <a:t>下載或刪除</a:t>
+            </a:r>
+            <a:r>
+              <a:rPr lang="en-US" altLang="zh-CN" dirty="0"/>
+              <a:t>cache</a:t>
+            </a:r>
+            <a:r>
+              <a:rPr lang="zh-CN" altLang="en-US" dirty="0"/>
+              <a:t>的影像</a:t>
+            </a:r>
+            <a:endParaRPr lang="en-US" altLang="zh-CN" dirty="0"/>
+          </a:p>
+          <a:p>
+            <a:r>
+              <a:rPr lang="en-US" altLang="zh-CN" dirty="0"/>
+              <a:t>Method: POST, GET, DELETE</a:t>
+            </a:r>
+          </a:p>
+        </p:txBody>
+      </p:sp>
+    </p:spTree>
+    <p:extLst>
+      <p:ext uri="{BB962C8B-B14F-4D97-AF65-F5344CB8AC3E}">
+        <p14:creationId xmlns:p14="http://schemas.microsoft.com/office/powerpoint/2010/main" val="2988508316"/>
+      </p:ext>
+    </p:extLst>
+  </p:cSld>
+  <p:clrMapOvr>
+    <a:masterClrMapping/>
+  </p:clrMapOvr>
+</p:sld>
+</file>
+
+<file path=ppt/slides/slide7.xml><?xml version="1.0" encoding="utf-8"?>
+<p:sld xmlns:a="http://schemas.openxmlformats.org/drawingml/2006/main" xmlns:r="http://schemas.openxmlformats.org/officeDocument/2006/relationships" xmlns:p="http://schemas.openxmlformats.org/presentationml/2006/main">
+  <p:cSld>
+    <p:spTree>
+      <p:nvGrpSpPr>
+        <p:cNvPr id="1" name=""/>
+        <p:cNvGrpSpPr/>
+        <p:nvPr/>
+      </p:nvGrpSpPr>
+      <p:grpSpPr>
+        <a:xfrm>
+          <a:off x="0" y="0"/>
+          <a:ext cx="0" cy="0"/>
+          <a:chOff x="0" y="0"/>
+          <a:chExt cx="0" cy="0"/>
+        </a:xfrm>
+      </p:grpSpPr>
+      <p:sp>
+        <p:nvSpPr>
+          <p:cNvPr id="2" name="標題 1"/>
+          <p:cNvSpPr>
+            <a:spLocks noGrp="1"/>
+          </p:cNvSpPr>
+          <p:nvPr>
+            <p:ph type="title"/>
+          </p:nvPr>
+        </p:nvSpPr>
+        <p:spPr/>
+        <p:txBody>
+          <a:bodyPr/>
+          <a:lstStyle/>
+          <a:p>
+            <a:r>
+              <a:rPr lang="zh-CN" altLang="en-US" dirty="0"/>
               <a:t>每個專案建議呼叫順序</a:t>
             </a:r>
             <a:endParaRPr lang="zh-TW" altLang="en-US" dirty="0"/>
@@ -3765,43 +3928,43 @@
               <a:buAutoNum type="arabicPeriod"/>
             </a:pPr>
             <a:r>
-              <a:rPr lang="zh-CN" altLang="en-US" dirty="0" smtClean="0"/>
+              <a:rPr lang="zh-CN" altLang="en-US" dirty="0"/>
               <a:t>使用專案中中間的影像計算套疊矩陣</a:t>
             </a:r>
             <a:r>
-              <a:rPr lang="en-US" altLang="zh-CN" dirty="0" smtClean="0"/>
+              <a:rPr lang="en-US" altLang="zh-CN" dirty="0"/>
               <a:t>(</a:t>
             </a:r>
             <a:r>
-              <a:rPr lang="zh-CN" altLang="en-US" dirty="0" smtClean="0"/>
+              <a:rPr lang="zh-CN" altLang="en-US" dirty="0"/>
               <a:t>不建議使用第一張或最後一張</a:t>
             </a:r>
             <a:r>
-              <a:rPr lang="en-US" altLang="zh-CN" dirty="0" smtClean="0"/>
+              <a:rPr lang="en-US" altLang="zh-CN" dirty="0"/>
               <a:t>)</a:t>
             </a:r>
             <a:r>
-              <a:rPr lang="zh-CN" altLang="en-US" dirty="0" smtClean="0"/>
+              <a:rPr lang="zh-CN" altLang="en-US" dirty="0"/>
               <a:t>，呼叫</a:t>
             </a:r>
             <a:r>
-              <a:rPr lang="en-US" altLang="zh-CN" dirty="0" err="1" smtClean="0"/>
+              <a:rPr lang="en-US" altLang="zh-CN" dirty="0" err="1"/>
               <a:t>calallignment</a:t>
             </a:r>
             <a:r>
-              <a:rPr lang="zh-CN" altLang="en-US" dirty="0" smtClean="0"/>
+              <a:rPr lang="zh-CN" altLang="en-US" dirty="0"/>
               <a:t>取得套疊矩陣</a:t>
             </a:r>
             <a:r>
-              <a:rPr lang="en-US" altLang="zh-CN" dirty="0" smtClean="0"/>
+              <a:rPr lang="en-US" altLang="zh-CN" dirty="0"/>
               <a:t>(</a:t>
             </a:r>
             <a:r>
-              <a:rPr lang="en-US" altLang="zh-CN" dirty="0" err="1" smtClean="0"/>
+              <a:rPr lang="en-US" altLang="zh-CN" dirty="0" err="1"/>
               <a:t>allignmat</a:t>
             </a:r>
             <a:r>
-              <a:rPr lang="en-US" altLang="zh-CN" dirty="0" smtClean="0"/>
+              <a:rPr lang="en-US" altLang="zh-CN" dirty="0"/>
               <a:t>)</a:t>
             </a:r>
           </a:p>
@@ -3811,126 +3974,105 @@
               <a:buAutoNum type="arabicPeriod"/>
             </a:pPr>
             <a:r>
-              <a:rPr lang="zh-CN" altLang="en-US" dirty="0" smtClean="0"/>
-              <a:t>使用</a:t>
-            </a:r>
-            <a:r>
-              <a:rPr lang="zh-CN" altLang="en-US" dirty="0" smtClean="0"/>
-              <a:t>套疊矩陣</a:t>
-            </a:r>
-            <a:r>
-              <a:rPr lang="zh-CN" altLang="en-US" dirty="0" smtClean="0"/>
-              <a:t>對專案內所有影像進行</a:t>
-            </a:r>
-            <a:r>
-              <a:rPr lang="en-US" altLang="zh-CN" dirty="0" smtClean="0"/>
+              <a:rPr lang="zh-CN" altLang="en-US" dirty="0"/>
+              <a:t>使用套疊矩陣對專案內所有影像進行</a:t>
+            </a:r>
+            <a:r>
+              <a:rPr lang="en-US" altLang="zh-CN" dirty="0"/>
               <a:t>,</a:t>
             </a:r>
             <a:r>
-              <a:rPr lang="zh-CN" altLang="en-US" dirty="0" smtClean="0"/>
+              <a:rPr lang="zh-CN" altLang="en-US" dirty="0"/>
               <a:t>呼叫</a:t>
             </a:r>
             <a:r>
-              <a:rPr lang="en-US" altLang="zh-CN" dirty="0" smtClean="0"/>
+              <a:rPr lang="en-US" altLang="zh-CN" dirty="0"/>
               <a:t>alignment</a:t>
             </a:r>
             <a:r>
-              <a:rPr lang="zh-CN" altLang="en-US" dirty="0" smtClean="0"/>
-              <a:t>取得</a:t>
-            </a:r>
-            <a:r>
-              <a:rPr lang="zh-CN" altLang="en-US" dirty="0" smtClean="0"/>
-              <a:t>套疊後的影像</a:t>
-            </a:r>
-            <a:r>
               <a:rPr lang="zh-CN" altLang="en-US" dirty="0"/>
-              <a:t>鏈接</a:t>
-            </a:r>
-            <a:endParaRPr lang="en-US" altLang="zh-CN" dirty="0" smtClean="0"/>
+              <a:t>取得套疊後的影像鏈接</a:t>
+            </a:r>
+            <a:endParaRPr lang="en-US" altLang="zh-CN" dirty="0"/>
           </a:p>
           <a:p>
             <a:pPr marL="514350" indent="-514350">
               <a:buAutoNum type="arabicPeriod"/>
             </a:pPr>
             <a:r>
-              <a:rPr lang="zh-CN" altLang="en-US" dirty="0" smtClean="0"/>
+              <a:rPr lang="zh-CN" altLang="en-US" dirty="0"/>
               <a:t>使用</a:t>
             </a:r>
             <a:r>
-              <a:rPr lang="en-US" altLang="zh-CN" dirty="0" smtClean="0"/>
+              <a:rPr lang="en-US" altLang="zh-CN" dirty="0"/>
               <a:t>download(get/post) </a:t>
             </a:r>
             <a:r>
-              <a:rPr lang="zh-CN" altLang="en-US" dirty="0" smtClean="0"/>
-              <a:t>下載套</a:t>
-            </a:r>
-            <a:r>
-              <a:rPr lang="zh-CN" altLang="en-US" dirty="0" smtClean="0"/>
-              <a:t>疊後的影像</a:t>
-            </a:r>
-            <a:endParaRPr lang="en-US" altLang="zh-CN" dirty="0" smtClean="0"/>
+              <a:rPr lang="zh-CN" altLang="en-US" dirty="0"/>
+              <a:t>下載套疊後的影像</a:t>
+            </a:r>
+            <a:endParaRPr lang="en-US" altLang="zh-CN" dirty="0"/>
           </a:p>
           <a:p>
             <a:pPr marL="514350" indent="-514350">
               <a:buAutoNum type="arabicPeriod"/>
             </a:pPr>
             <a:r>
-              <a:rPr lang="zh-CN" altLang="en-US" dirty="0" smtClean="0"/>
+              <a:rPr lang="zh-CN" altLang="en-US" dirty="0"/>
               <a:t>使用</a:t>
             </a:r>
             <a:r>
-              <a:rPr lang="en-US" altLang="zh-CN" dirty="0" smtClean="0"/>
+              <a:rPr lang="en-US" altLang="zh-CN" dirty="0"/>
               <a:t>download(delete)</a:t>
             </a:r>
             <a:r>
-              <a:rPr lang="zh-CN" altLang="en-US" dirty="0" smtClean="0"/>
+              <a:rPr lang="zh-CN" altLang="en-US" dirty="0"/>
               <a:t>清除</a:t>
             </a:r>
             <a:r>
-              <a:rPr lang="en-US" altLang="zh-CN" dirty="0" smtClean="0"/>
+              <a:rPr lang="en-US" altLang="zh-CN" dirty="0"/>
               <a:t>server cache</a:t>
             </a:r>
-            <a:endParaRPr lang="en-US" altLang="zh-CN" dirty="0"/>
           </a:p>
           <a:p>
             <a:pPr marL="514350" indent="-514350">
               <a:buAutoNum type="arabicPeriod"/>
             </a:pPr>
             <a:r>
-              <a:rPr lang="zh-CN" altLang="en-US" dirty="0" smtClean="0"/>
+              <a:rPr lang="zh-CN" altLang="en-US" dirty="0"/>
               <a:t>使用</a:t>
             </a:r>
             <a:r>
-              <a:rPr lang="en-US" altLang="zh-CN" dirty="0" err="1" smtClean="0"/>
+              <a:rPr lang="en-US" altLang="zh-CN" dirty="0" err="1"/>
               <a:t>cal</a:t>
             </a:r>
             <a:r>
-              <a:rPr lang="zh-CN" altLang="en-US" dirty="0" smtClean="0"/>
+              <a:rPr lang="zh-CN" altLang="en-US" dirty="0"/>
               <a:t>計算需要</a:t>
             </a:r>
             <a:r>
-              <a:rPr lang="zh-CN" altLang="en-US" smtClean="0"/>
+              <a:rPr lang="zh-CN" altLang="en-US"/>
               <a:t>的指標</a:t>
             </a:r>
-            <a:endParaRPr lang="en-US" altLang="zh-CN" dirty="0" smtClean="0"/>
+            <a:endParaRPr lang="en-US" altLang="zh-CN" dirty="0"/>
           </a:p>
           <a:p>
             <a:pPr marL="514350" indent="-514350">
               <a:buAutoNum type="arabicPeriod"/>
             </a:pPr>
             <a:r>
-              <a:rPr lang="zh-CN" altLang="en-US" dirty="0" smtClean="0"/>
+              <a:rPr lang="zh-CN" altLang="en-US" dirty="0"/>
               <a:t>使用</a:t>
             </a:r>
             <a:r>
-              <a:rPr lang="en-US" altLang="zh-CN" dirty="0" smtClean="0"/>
+              <a:rPr lang="en-US" altLang="zh-CN" dirty="0"/>
               <a:t>download(get/post)</a:t>
             </a:r>
             <a:r>
-              <a:rPr lang="zh-CN" altLang="en-US" dirty="0" smtClean="0"/>
+              <a:rPr lang="zh-CN" altLang="en-US" dirty="0"/>
               <a:t>下載結果</a:t>
             </a:r>
-            <a:endParaRPr lang="en-US" altLang="zh-CN" dirty="0" smtClean="0"/>
+            <a:endParaRPr lang="en-US" altLang="zh-CN" dirty="0"/>
           </a:p>
           <a:p>
             <a:pPr marL="514350" indent="-514350">
@@ -3938,19 +4080,19 @@
               <a:buAutoNum type="arabicPeriod"/>
             </a:pPr>
             <a:r>
-              <a:rPr lang="zh-CN" altLang="en-US" dirty="0" smtClean="0"/>
+              <a:rPr lang="zh-CN" altLang="en-US" dirty="0"/>
               <a:t>使用</a:t>
             </a:r>
             <a:r>
-              <a:rPr lang="en-US" altLang="zh-CN" dirty="0" smtClean="0"/>
+              <a:rPr lang="en-US" altLang="zh-CN" dirty="0"/>
               <a:t>download(delete)</a:t>
             </a:r>
             <a:r>
-              <a:rPr lang="zh-CN" altLang="en-US" dirty="0" smtClean="0"/>
+              <a:rPr lang="zh-CN" altLang="en-US" dirty="0"/>
               <a:t>清除</a:t>
             </a:r>
             <a:r>
-              <a:rPr lang="en-US" altLang="zh-CN" dirty="0" smtClean="0"/>
+              <a:rPr lang="en-US" altLang="zh-CN" dirty="0"/>
               <a:t>server cache</a:t>
             </a:r>
           </a:p>
@@ -3958,13 +4100,13 @@
             <a:pPr marL="514350" indent="-514350">
               <a:buAutoNum type="arabicPeriod"/>
             </a:pPr>
-            <a:endParaRPr lang="en-US" altLang="zh-CN" dirty="0" smtClean="0"/>
+            <a:endParaRPr lang="en-US" altLang="zh-CN" dirty="0"/>
           </a:p>
           <a:p>
             <a:pPr marL="514350" indent="-514350">
               <a:buAutoNum type="arabicPeriod"/>
             </a:pPr>
-            <a:endParaRPr lang="en-US" altLang="zh-CN" dirty="0" smtClean="0"/>
+            <a:endParaRPr lang="en-US" altLang="zh-CN" dirty="0"/>
           </a:p>
         </p:txBody>
       </p:sp>

</xml_diff>

<commit_message>
add maxiteration to calallignment
</commit_message>
<xml_diff>
--- a/MicasenseMX30API.pptx
+++ b/MicasenseMX30API.pptx
@@ -247,7 +247,7 @@
           <a:p>
             <a:fld id="{EBD1E9CA-27D0-485D-BB40-6DD66428CCC0}" type="datetimeFigureOut">
               <a:rPr lang="zh-TW" altLang="en-US" smtClean="0"/>
-              <a:t>2021/3/5</a:t>
+              <a:t>2021/3/10</a:t>
             </a:fld>
             <a:endParaRPr lang="zh-TW" altLang="en-US"/>
           </a:p>
@@ -415,7 +415,7 @@
           <a:p>
             <a:fld id="{EBD1E9CA-27D0-485D-BB40-6DD66428CCC0}" type="datetimeFigureOut">
               <a:rPr lang="zh-TW" altLang="en-US" smtClean="0"/>
-              <a:t>2021/3/5</a:t>
+              <a:t>2021/3/10</a:t>
             </a:fld>
             <a:endParaRPr lang="zh-TW" altLang="en-US"/>
           </a:p>
@@ -593,7 +593,7 @@
           <a:p>
             <a:fld id="{EBD1E9CA-27D0-485D-BB40-6DD66428CCC0}" type="datetimeFigureOut">
               <a:rPr lang="zh-TW" altLang="en-US" smtClean="0"/>
-              <a:t>2021/3/5</a:t>
+              <a:t>2021/3/10</a:t>
             </a:fld>
             <a:endParaRPr lang="zh-TW" altLang="en-US"/>
           </a:p>
@@ -761,7 +761,7 @@
           <a:p>
             <a:fld id="{EBD1E9CA-27D0-485D-BB40-6DD66428CCC0}" type="datetimeFigureOut">
               <a:rPr lang="zh-TW" altLang="en-US" smtClean="0"/>
-              <a:t>2021/3/5</a:t>
+              <a:t>2021/3/10</a:t>
             </a:fld>
             <a:endParaRPr lang="zh-TW" altLang="en-US"/>
           </a:p>
@@ -1006,7 +1006,7 @@
           <a:p>
             <a:fld id="{EBD1E9CA-27D0-485D-BB40-6DD66428CCC0}" type="datetimeFigureOut">
               <a:rPr lang="zh-TW" altLang="en-US" smtClean="0"/>
-              <a:t>2021/3/5</a:t>
+              <a:t>2021/3/10</a:t>
             </a:fld>
             <a:endParaRPr lang="zh-TW" altLang="en-US"/>
           </a:p>
@@ -1235,7 +1235,7 @@
           <a:p>
             <a:fld id="{EBD1E9CA-27D0-485D-BB40-6DD66428CCC0}" type="datetimeFigureOut">
               <a:rPr lang="zh-TW" altLang="en-US" smtClean="0"/>
-              <a:t>2021/3/5</a:t>
+              <a:t>2021/3/10</a:t>
             </a:fld>
             <a:endParaRPr lang="zh-TW" altLang="en-US"/>
           </a:p>
@@ -1599,7 +1599,7 @@
           <a:p>
             <a:fld id="{EBD1E9CA-27D0-485D-BB40-6DD66428CCC0}" type="datetimeFigureOut">
               <a:rPr lang="zh-TW" altLang="en-US" smtClean="0"/>
-              <a:t>2021/3/5</a:t>
+              <a:t>2021/3/10</a:t>
             </a:fld>
             <a:endParaRPr lang="zh-TW" altLang="en-US"/>
           </a:p>
@@ -1716,7 +1716,7 @@
           <a:p>
             <a:fld id="{EBD1E9CA-27D0-485D-BB40-6DD66428CCC0}" type="datetimeFigureOut">
               <a:rPr lang="zh-TW" altLang="en-US" smtClean="0"/>
-              <a:t>2021/3/5</a:t>
+              <a:t>2021/3/10</a:t>
             </a:fld>
             <a:endParaRPr lang="zh-TW" altLang="en-US"/>
           </a:p>
@@ -1811,7 +1811,7 @@
           <a:p>
             <a:fld id="{EBD1E9CA-27D0-485D-BB40-6DD66428CCC0}" type="datetimeFigureOut">
               <a:rPr lang="zh-TW" altLang="en-US" smtClean="0"/>
-              <a:t>2021/3/5</a:t>
+              <a:t>2021/3/10</a:t>
             </a:fld>
             <a:endParaRPr lang="zh-TW" altLang="en-US"/>
           </a:p>
@@ -2086,7 +2086,7 @@
           <a:p>
             <a:fld id="{EBD1E9CA-27D0-485D-BB40-6DD66428CCC0}" type="datetimeFigureOut">
               <a:rPr lang="zh-TW" altLang="en-US" smtClean="0"/>
-              <a:t>2021/3/5</a:t>
+              <a:t>2021/3/10</a:t>
             </a:fld>
             <a:endParaRPr lang="zh-TW" altLang="en-US"/>
           </a:p>
@@ -2338,7 +2338,7 @@
           <a:p>
             <a:fld id="{EBD1E9CA-27D0-485D-BB40-6DD66428CCC0}" type="datetimeFigureOut">
               <a:rPr lang="zh-TW" altLang="en-US" smtClean="0"/>
-              <a:t>2021/3/5</a:t>
+              <a:t>2021/3/10</a:t>
             </a:fld>
             <a:endParaRPr lang="zh-TW" altLang="en-US"/>
           </a:p>
@@ -2549,7 +2549,7 @@
           <a:p>
             <a:fld id="{EBD1E9CA-27D0-485D-BB40-6DD66428CCC0}" type="datetimeFigureOut">
               <a:rPr lang="zh-TW" altLang="en-US" smtClean="0"/>
-              <a:t>2021/3/5</a:t>
+              <a:t>2021/3/10</a:t>
             </a:fld>
             <a:endParaRPr lang="zh-TW" altLang="en-US"/>
           </a:p>
@@ -3007,9 +3007,129 @@
           <a:chExt cx="0" cy="0"/>
         </a:xfrm>
       </p:grpSpPr>
+      <p:sp>
+        <p:nvSpPr>
+          <p:cNvPr id="2" name="標題 1"/>
+          <p:cNvSpPr>
+            <a:spLocks noGrp="1"/>
+          </p:cNvSpPr>
+          <p:nvPr>
+            <p:ph type="title"/>
+          </p:nvPr>
+        </p:nvSpPr>
+        <p:spPr/>
+        <p:txBody>
+          <a:bodyPr/>
+          <a:lstStyle/>
+          <a:p>
+            <a:r>
+              <a:rPr lang="en-US" altLang="zh-CN" dirty="0" err="1"/>
+              <a:t>c</a:t>
+            </a:r>
+            <a:r>
+              <a:rPr lang="en-US" altLang="zh-TW" dirty="0" err="1"/>
+              <a:t>alallignment</a:t>
+            </a:r>
+            <a:endParaRPr lang="zh-TW" altLang="en-US" dirty="0"/>
+          </a:p>
+        </p:txBody>
+      </p:sp>
+      <p:sp>
+        <p:nvSpPr>
+          <p:cNvPr id="3" name="內容版面配置區 2"/>
+          <p:cNvSpPr>
+            <a:spLocks noGrp="1"/>
+          </p:cNvSpPr>
+          <p:nvPr>
+            <p:ph idx="1"/>
+          </p:nvPr>
+        </p:nvSpPr>
+        <p:spPr>
+          <a:xfrm>
+            <a:off x="838200" y="1825625"/>
+            <a:ext cx="5679136" cy="4351338"/>
+          </a:xfrm>
+        </p:spPr>
+        <p:txBody>
+          <a:bodyPr/>
+          <a:lstStyle/>
+          <a:p>
+            <a:r>
+              <a:rPr lang="zh-TW" altLang="en-US" b="1" dirty="0"/>
+              <a:t> </a:t>
+            </a:r>
+            <a:r>
+              <a:rPr lang="zh-TW" altLang="en-US" dirty="0"/>
+              <a:t>遙測影像</a:t>
+            </a:r>
+            <a:r>
+              <a:rPr lang="zh-CN" altLang="en-US" dirty="0"/>
+              <a:t>計算</a:t>
+            </a:r>
+            <a:r>
+              <a:rPr lang="en-US" altLang="zh-CN" dirty="0"/>
+              <a:t>alignment matrix</a:t>
+            </a:r>
+          </a:p>
+          <a:p>
+            <a:r>
+              <a:rPr lang="en-US" altLang="zh-CN" dirty="0" err="1"/>
+              <a:t>Method:POST</a:t>
+            </a:r>
+            <a:endParaRPr lang="en-US" altLang="zh-CN" dirty="0"/>
+          </a:p>
+          <a:p>
+            <a:r>
+              <a:rPr lang="en-US" altLang="zh-CN" dirty="0"/>
+              <a:t>Input :5 </a:t>
+            </a:r>
+            <a:r>
+              <a:rPr lang="zh-CN" altLang="en-US" dirty="0"/>
+              <a:t>個</a:t>
+            </a:r>
+            <a:r>
+              <a:rPr lang="en-US" altLang="zh-CN" dirty="0"/>
+              <a:t>band </a:t>
+            </a:r>
+            <a:r>
+              <a:rPr lang="zh-CN" altLang="en-US" dirty="0"/>
+              <a:t>影像下載點及</a:t>
+            </a:r>
+            <a:r>
+              <a:rPr lang="en-US" altLang="zh-CN" dirty="0" err="1"/>
+              <a:t>maxiteration</a:t>
+            </a:r>
+            <a:r>
+              <a:rPr lang="en-US" altLang="zh-CN" dirty="0"/>
+              <a:t>(optional)</a:t>
+            </a:r>
+          </a:p>
+          <a:p>
+            <a:pPr marL="914400" lvl="2" indent="0">
+              <a:buNone/>
+            </a:pPr>
+            <a:r>
+              <a:rPr lang="en-US" altLang="zh-CN" dirty="0"/>
+              <a:t> </a:t>
+            </a:r>
+            <a:endParaRPr lang="en-US" altLang="zh-TW" dirty="0"/>
+          </a:p>
+          <a:p>
+            <a:r>
+              <a:rPr lang="en-US" altLang="zh-CN" dirty="0"/>
+              <a:t>Output: </a:t>
+            </a:r>
+            <a:r>
+              <a:rPr lang="en-US" altLang="zh-CN" dirty="0" err="1"/>
+              <a:t>alignmat</a:t>
+            </a:r>
+            <a:endParaRPr lang="zh-TW" altLang="en-US" dirty="0"/>
+          </a:p>
+        </p:txBody>
+      </p:sp>
       <p:pic>
         <p:nvPicPr>
-          <p:cNvPr id="4" name="圖片 3"/>
+          <p:cNvPr id="5" name="圖片 4"/>
           <p:cNvPicPr>
             <a:picLocks noChangeAspect="1"/>
           </p:cNvPicPr>
@@ -3023,137 +3143,17 @@
         </p:blipFill>
         <p:spPr>
           <a:xfrm>
-            <a:off x="5958840" y="848680"/>
-            <a:ext cx="5679136" cy="2978979"/>
+            <a:off x="0" y="4965895"/>
+            <a:ext cx="11353800" cy="1628605"/>
           </a:xfrm>
           <a:prstGeom prst="rect">
             <a:avLst/>
           </a:prstGeom>
         </p:spPr>
       </p:pic>
-      <p:sp>
-        <p:nvSpPr>
-          <p:cNvPr id="2" name="標題 1"/>
-          <p:cNvSpPr>
-            <a:spLocks noGrp="1"/>
-          </p:cNvSpPr>
-          <p:nvPr>
-            <p:ph type="title"/>
-          </p:nvPr>
-        </p:nvSpPr>
-        <p:spPr/>
-        <p:txBody>
-          <a:bodyPr/>
-          <a:lstStyle/>
-          <a:p>
-            <a:r>
-              <a:rPr lang="en-US" altLang="zh-CN" dirty="0" err="1"/>
-              <a:t>c</a:t>
-            </a:r>
-            <a:r>
-              <a:rPr lang="en-US" altLang="zh-TW" dirty="0" err="1"/>
-              <a:t>alallignment</a:t>
-            </a:r>
-            <a:endParaRPr lang="zh-TW" altLang="en-US" dirty="0"/>
-          </a:p>
-        </p:txBody>
-      </p:sp>
-      <p:sp>
-        <p:nvSpPr>
-          <p:cNvPr id="3" name="內容版面配置區 2"/>
-          <p:cNvSpPr>
-            <a:spLocks noGrp="1"/>
-          </p:cNvSpPr>
-          <p:nvPr>
-            <p:ph idx="1"/>
-          </p:nvPr>
-        </p:nvSpPr>
-        <p:spPr>
-          <a:xfrm>
-            <a:off x="838200" y="1825625"/>
-            <a:ext cx="5679136" cy="4351338"/>
-          </a:xfrm>
-        </p:spPr>
-        <p:txBody>
-          <a:bodyPr/>
-          <a:lstStyle/>
-          <a:p>
-            <a:r>
-              <a:rPr lang="zh-TW" altLang="en-US" b="1" dirty="0"/>
-              <a:t> </a:t>
-            </a:r>
-            <a:r>
-              <a:rPr lang="zh-TW" altLang="en-US" dirty="0"/>
-              <a:t>遙測影像</a:t>
-            </a:r>
-            <a:r>
-              <a:rPr lang="zh-CN" altLang="en-US" dirty="0"/>
-              <a:t>計算</a:t>
-            </a:r>
-            <a:r>
-              <a:rPr lang="en-US" altLang="zh-CN" dirty="0"/>
-              <a:t>alignment matrix</a:t>
-            </a:r>
-          </a:p>
-          <a:p>
-            <a:r>
-              <a:rPr lang="en-US" altLang="zh-CN" dirty="0" err="1"/>
-              <a:t>Method:POST</a:t>
-            </a:r>
-            <a:endParaRPr lang="en-US" altLang="zh-CN" dirty="0"/>
-          </a:p>
-          <a:p>
-            <a:r>
-              <a:rPr lang="en-US" altLang="zh-CN" dirty="0"/>
-              <a:t>Input :5 </a:t>
-            </a:r>
-            <a:r>
-              <a:rPr lang="zh-CN" altLang="en-US" dirty="0"/>
-              <a:t>個</a:t>
-            </a:r>
-            <a:r>
-              <a:rPr lang="en-US" altLang="zh-CN" dirty="0"/>
-              <a:t>band </a:t>
-            </a:r>
-            <a:r>
-              <a:rPr lang="zh-CN" altLang="en-US" dirty="0"/>
-              <a:t>影像下載點及</a:t>
-            </a:r>
-            <a:r>
-              <a:rPr lang="en-US" altLang="zh-CN" dirty="0" err="1"/>
-              <a:t>maxiteration</a:t>
-            </a:r>
-            <a:r>
-              <a:rPr lang="en-US" altLang="zh-CN" dirty="0"/>
-              <a:t>(optional)</a:t>
-            </a:r>
-          </a:p>
-          <a:p>
-            <a:pPr marL="914400" lvl="2" indent="0">
-              <a:buNone/>
-            </a:pPr>
-            <a:r>
-              <a:rPr lang="en-US" altLang="zh-CN" dirty="0"/>
-              <a:t> </a:t>
-            </a:r>
-            <a:endParaRPr lang="en-US" altLang="zh-TW" dirty="0"/>
-          </a:p>
-          <a:p>
-            <a:r>
-              <a:rPr lang="en-US" altLang="zh-CN" dirty="0"/>
-              <a:t>Output: </a:t>
-            </a:r>
-            <a:r>
-              <a:rPr lang="en-US" altLang="zh-CN" dirty="0" err="1"/>
-              <a:t>alignmat</a:t>
-            </a:r>
-            <a:endParaRPr lang="zh-TW" altLang="en-US" dirty="0"/>
-          </a:p>
-        </p:txBody>
-      </p:sp>
       <p:pic>
         <p:nvPicPr>
-          <p:cNvPr id="5" name="圖片 4"/>
+          <p:cNvPr id="6" name="圖片 5"/>
           <p:cNvPicPr>
             <a:picLocks noChangeAspect="1"/>
           </p:cNvPicPr>
@@ -3167,8 +3167,8 @@
         </p:blipFill>
         <p:spPr>
           <a:xfrm>
-            <a:off x="0" y="4965895"/>
-            <a:ext cx="11353800" cy="1628605"/>
+            <a:off x="6096000" y="1185652"/>
+            <a:ext cx="6067638" cy="2920522"/>
           </a:xfrm>
           <a:prstGeom prst="rect">
             <a:avLst/>
@@ -3463,6 +3463,10 @@
             <a:r>
               <a:rPr lang="zh-CN" altLang="en-US" dirty="0"/>
               <a:t>影像下載點</a:t>
+            </a:r>
+            <a:r>
+              <a:rPr lang="en-US" altLang="zh-CN" dirty="0"/>
+              <a:t/>
             </a:r>
             <a:br>
               <a:rPr lang="en-US" altLang="zh-CN" dirty="0"/>
@@ -3666,6 +3670,10 @@
               <a:rPr lang="zh-CN" altLang="en-US" dirty="0"/>
               <a:t>影像下載點</a:t>
             </a:r>
+            <a:r>
+              <a:rPr lang="en-US" altLang="zh-CN" dirty="0"/>
+              <a:t/>
+            </a:r>
             <a:br>
               <a:rPr lang="en-US" altLang="zh-CN" dirty="0"/>
             </a:br>
@@ -3680,6 +3688,10 @@
             <a:r>
               <a:rPr lang="zh-CN" altLang="en-US" dirty="0"/>
               <a:t>為需計算的動作之陣列</a:t>
+            </a:r>
+            <a:r>
+              <a:rPr lang="en-US" altLang="zh-CN" dirty="0"/>
+              <a:t/>
             </a:r>
             <a:br>
               <a:rPr lang="en-US" altLang="zh-CN" dirty="0"/>

</xml_diff>